<commit_message>
slide fixed + Readme file updated
</commit_message>
<xml_diff>
--- a/Lecture Notes-Slides/Lecture 6.pptx
+++ b/Lecture Notes-Slides/Lecture 6.pptx
@@ -317,7 +317,7 @@
           <a:p>
             <a:fld id="{D5090F48-C128-B147-B831-CB094B7B4021}" type="datetimeFigureOut">
               <a:rPr lang="en-US" smtClean="0"/>
-              <a:t>2/16/16</a:t>
+              <a:t>2/17/16</a:t>
             </a:fld>
             <a:endParaRPr lang="en-US"/>
           </a:p>
@@ -482,7 +482,7 @@
           <a:p>
             <a:fld id="{D5090F48-C128-B147-B831-CB094B7B4021}" type="datetimeFigureOut">
               <a:rPr lang="en-US" smtClean="0"/>
-              <a:t>2/16/16</a:t>
+              <a:t>2/17/16</a:t>
             </a:fld>
             <a:endParaRPr lang="en-US"/>
           </a:p>
@@ -657,7 +657,7 @@
           <a:p>
             <a:fld id="{D5090F48-C128-B147-B831-CB094B7B4021}" type="datetimeFigureOut">
               <a:rPr lang="en-US" smtClean="0"/>
-              <a:t>2/16/16</a:t>
+              <a:t>2/17/16</a:t>
             </a:fld>
             <a:endParaRPr lang="en-US"/>
           </a:p>
@@ -822,7 +822,7 @@
           <a:p>
             <a:fld id="{D5090F48-C128-B147-B831-CB094B7B4021}" type="datetimeFigureOut">
               <a:rPr lang="en-US" smtClean="0"/>
-              <a:t>2/16/16</a:t>
+              <a:t>2/17/16</a:t>
             </a:fld>
             <a:endParaRPr lang="en-US"/>
           </a:p>
@@ -1063,7 +1063,7 @@
           <a:p>
             <a:fld id="{D5090F48-C128-B147-B831-CB094B7B4021}" type="datetimeFigureOut">
               <a:rPr lang="en-US" smtClean="0"/>
-              <a:t>2/16/16</a:t>
+              <a:t>2/17/16</a:t>
             </a:fld>
             <a:endParaRPr lang="en-US"/>
           </a:p>
@@ -1346,7 +1346,7 @@
           <a:p>
             <a:fld id="{D5090F48-C128-B147-B831-CB094B7B4021}" type="datetimeFigureOut">
               <a:rPr lang="en-US" smtClean="0"/>
-              <a:t>2/16/16</a:t>
+              <a:t>2/17/16</a:t>
             </a:fld>
             <a:endParaRPr lang="en-US"/>
           </a:p>
@@ -1775,7 +1775,7 @@
           <a:p>
             <a:fld id="{D5090F48-C128-B147-B831-CB094B7B4021}" type="datetimeFigureOut">
               <a:rPr lang="en-US" smtClean="0"/>
-              <a:t>2/16/16</a:t>
+              <a:t>2/17/16</a:t>
             </a:fld>
             <a:endParaRPr lang="en-US"/>
           </a:p>
@@ -1888,7 +1888,7 @@
           <a:p>
             <a:fld id="{D5090F48-C128-B147-B831-CB094B7B4021}" type="datetimeFigureOut">
               <a:rPr lang="en-US" smtClean="0"/>
-              <a:t>2/16/16</a:t>
+              <a:t>2/17/16</a:t>
             </a:fld>
             <a:endParaRPr lang="en-US"/>
           </a:p>
@@ -1978,7 +1978,7 @@
           <a:p>
             <a:fld id="{D5090F48-C128-B147-B831-CB094B7B4021}" type="datetimeFigureOut">
               <a:rPr lang="en-US" smtClean="0"/>
-              <a:t>2/16/16</a:t>
+              <a:t>2/17/16</a:t>
             </a:fld>
             <a:endParaRPr lang="en-US"/>
           </a:p>
@@ -2167,7 +2167,7 @@
           <a:p>
             <a:fld id="{D5090F48-C128-B147-B831-CB094B7B4021}" type="datetimeFigureOut">
               <a:rPr lang="en-US" smtClean="0"/>
-              <a:t>2/16/16</a:t>
+              <a:t>2/17/16</a:t>
             </a:fld>
             <a:endParaRPr lang="en-US"/>
           </a:p>
@@ -2485,7 +2485,7 @@
           <a:p>
             <a:fld id="{D5090F48-C128-B147-B831-CB094B7B4021}" type="datetimeFigureOut">
               <a:rPr lang="en-US" smtClean="0"/>
-              <a:t>2/16/16</a:t>
+              <a:t>2/17/16</a:t>
             </a:fld>
             <a:endParaRPr lang="en-US"/>
           </a:p>
@@ -2864,7 +2864,7 @@
           <a:p>
             <a:fld id="{D5090F48-C128-B147-B831-CB094B7B4021}" type="datetimeFigureOut">
               <a:rPr lang="en-US" smtClean="0"/>
-              <a:t>2/16/16</a:t>
+              <a:t>2/17/16</a:t>
             </a:fld>
             <a:endParaRPr lang="en-US"/>
           </a:p>
@@ -4610,24 +4610,14 @@
           <a:p>
             <a:r>
               <a:rPr lang="en-US" dirty="0" smtClean="0"/>
-              <a:t>Backward selection</a:t>
-            </a:r>
+              <a:t>Backward selection(Python is not that good for this method)</a:t>
+            </a:r>
+          </a:p>
+          <a:p>
             <a:r>
               <a:rPr lang="en-US" dirty="0" smtClean="0"/>
-              <a:t>(Python is not that good for this method)</a:t>
-            </a:r>
-            <a:endParaRPr lang="en-US" dirty="0" smtClean="0"/>
-          </a:p>
-          <a:p>
-            <a:r>
-              <a:rPr lang="en-US" dirty="0" smtClean="0"/>
-              <a:t>All subset selection</a:t>
-            </a:r>
-            <a:r>
-              <a:rPr lang="en-US" dirty="0" smtClean="0"/>
-              <a:t>(Python is not that good for this method)</a:t>
-            </a:r>
-            <a:endParaRPr lang="en-US" dirty="0" smtClean="0"/>
+              <a:t>All subset selection(Python is not that good for this method)</a:t>
+            </a:r>
           </a:p>
           <a:p>
             <a:r>
@@ -5538,8 +5528,12 @@
           </a:p>
           <a:p>
             <a:r>
+              <a:rPr lang="en-US" smtClean="0"/>
+              <a:t>Ridge and Lasso </a:t>
+            </a:r>
+            <a:r>
               <a:rPr lang="en-US" dirty="0" smtClean="0"/>
-              <a:t>Ridge Regression</a:t>
+              <a:t>Regression</a:t>
             </a:r>
           </a:p>
           <a:p>

</xml_diff>